<commit_message>
Nueral Nets power point
</commit_message>
<xml_diff>
--- a/3-Neural Networks/Hennie Brink - AI Meetup - Neural Nets.pptx
+++ b/3-Neural Networks/Hennie Brink - AI Meetup - Neural Nets.pptx
@@ -576,13 +576,21 @@
           <a:p>
             <a:r>
               <a:rPr lang="en-ZA" dirty="0"/>
-              <a:t>Rushil is helping us out on the Introductory track</a:t>
+              <a:t>Rushil </a:t>
             </a:r>
-          </a:p>
-          <a:p>
+            <a:r>
+              <a:rPr lang="en-ZA" dirty="0" err="1"/>
+              <a:t>a.k.a</a:t>
+            </a:r>
             <a:r>
               <a:rPr lang="en-ZA" dirty="0"/>
-              <a:t>Meetup line up</a:t>
+              <a:t> Russel is helping us out on the Introductory track</a:t>
+            </a:r>
+          </a:p>
+          <a:p>
+            <a:r>
+              <a:rPr lang="en-ZA" dirty="0"/>
+              <a:t>Line up</a:t>
             </a:r>
           </a:p>
           <a:p>
@@ -1754,7 +1762,7 @@
             </a:pPr>
             <a:r>
               <a:rPr lang="en-ZA" dirty="0"/>
-              <a:t>The nodes all talk to each other, each making a decision about a piece of the data and telling the others, eventually at the nodes at the listen to what all the other nodes said and makes a decision about what it is.</a:t>
+              <a:t>The nodes all talk to each other, each making a decision about a piece of the data and telling the others, eventually the nodes at the end listen to what all the other nodes said and makes a decision about what it is.</a:t>
             </a:r>
           </a:p>
           <a:p>
@@ -3640,7 +3648,7 @@
           </a:ln>
           <a:extLst>
             <a:ext uri="{C572A759-6A51-4108-AA02-DFA0A04FC94B}">
-              <ma14:wrappingTextBoxFlag xmlns:ma14="http://schemas.microsoft.com/office/mac/drawingml/2011/main" xmlns="" val="1"/>
+              <ma14:wrappingTextBoxFlag xmlns="" xmlns:ma14="http://schemas.microsoft.com/office/mac/drawingml/2011/main" val="1"/>
             </a:ext>
           </a:extLst>
         </p:spPr>
@@ -3679,7 +3687,7 @@
           </a:ln>
           <a:extLst>
             <a:ext uri="{C572A759-6A51-4108-AA02-DFA0A04FC94B}">
-              <ma14:wrappingTextBoxFlag xmlns:ma14="http://schemas.microsoft.com/office/mac/drawingml/2011/main" xmlns="" val="1"/>
+              <ma14:wrappingTextBoxFlag xmlns="" xmlns:ma14="http://schemas.microsoft.com/office/mac/drawingml/2011/main" val="1"/>
             </a:ext>
           </a:extLst>
         </p:spPr>
@@ -4734,7 +4742,7 @@
           </a:ln>
           <a:extLst>
             <a:ext uri="{C572A759-6A51-4108-AA02-DFA0A04FC94B}">
-              <ma14:wrappingTextBoxFlag xmlns:ma14="http://schemas.microsoft.com/office/mac/drawingml/2011/main" xmlns="" val="1"/>
+              <ma14:wrappingTextBoxFlag xmlns="" xmlns:ma14="http://schemas.microsoft.com/office/mac/drawingml/2011/main" val="1"/>
             </a:ext>
           </a:extLst>
         </p:spPr>
@@ -4842,7 +4850,7 @@
           </a:ln>
           <a:extLst>
             <a:ext uri="{C572A759-6A51-4108-AA02-DFA0A04FC94B}">
-              <ma14:wrappingTextBoxFlag xmlns:ma14="http://schemas.microsoft.com/office/mac/drawingml/2011/main" xmlns="" val="1"/>
+              <ma14:wrappingTextBoxFlag xmlns="" xmlns:ma14="http://schemas.microsoft.com/office/mac/drawingml/2011/main" val="1"/>
             </a:ext>
           </a:extLst>
         </p:spPr>
@@ -4942,7 +4950,7 @@
           </a:ln>
           <a:extLst>
             <a:ext uri="{C572A759-6A51-4108-AA02-DFA0A04FC94B}">
-              <ma14:wrappingTextBoxFlag xmlns:ma14="http://schemas.microsoft.com/office/mac/drawingml/2011/main" xmlns="" val="1"/>
+              <ma14:wrappingTextBoxFlag xmlns="" xmlns:ma14="http://schemas.microsoft.com/office/mac/drawingml/2011/main" val="1"/>
             </a:ext>
           </a:extLst>
         </p:spPr>
@@ -4993,7 +5001,7 @@
           </a:ln>
           <a:extLst>
             <a:ext uri="{C572A759-6A51-4108-AA02-DFA0A04FC94B}">
-              <ma14:wrappingTextBoxFlag xmlns:ma14="http://schemas.microsoft.com/office/mac/drawingml/2011/main" xmlns="" val="1"/>
+              <ma14:wrappingTextBoxFlag xmlns="" xmlns:ma14="http://schemas.microsoft.com/office/mac/drawingml/2011/main" val="1"/>
             </a:ext>
           </a:extLst>
         </p:spPr>
@@ -5106,7 +5114,7 @@
           </a:ln>
           <a:extLst>
             <a:ext uri="{C572A759-6A51-4108-AA02-DFA0A04FC94B}">
-              <ma14:wrappingTextBoxFlag xmlns:ma14="http://schemas.microsoft.com/office/mac/drawingml/2011/main" xmlns="" val="1"/>
+              <ma14:wrappingTextBoxFlag xmlns="" xmlns:ma14="http://schemas.microsoft.com/office/mac/drawingml/2011/main" val="1"/>
             </a:ext>
           </a:extLst>
         </p:spPr>
@@ -5189,7 +5197,7 @@
           </a:ln>
           <a:extLst>
             <a:ext uri="{C572A759-6A51-4108-AA02-DFA0A04FC94B}">
-              <ma14:wrappingTextBoxFlag xmlns:ma14="http://schemas.microsoft.com/office/mac/drawingml/2011/main" xmlns="" val="1"/>
+              <ma14:wrappingTextBoxFlag xmlns="" xmlns:ma14="http://schemas.microsoft.com/office/mac/drawingml/2011/main" val="1"/>
             </a:ext>
           </a:extLst>
         </p:spPr>
@@ -5276,7 +5284,7 @@
           </a:ln>
           <a:extLst>
             <a:ext uri="{C572A759-6A51-4108-AA02-DFA0A04FC94B}">
-              <ma14:wrappingTextBoxFlag xmlns:ma14="http://schemas.microsoft.com/office/mac/drawingml/2011/main" xmlns="" val="1"/>
+              <ma14:wrappingTextBoxFlag xmlns="" xmlns:ma14="http://schemas.microsoft.com/office/mac/drawingml/2011/main" val="1"/>
             </a:ext>
           </a:extLst>
         </p:spPr>
@@ -5356,7 +5364,7 @@
           </a:ln>
           <a:extLst>
             <a:ext uri="{C572A759-6A51-4108-AA02-DFA0A04FC94B}">
-              <ma14:wrappingTextBoxFlag xmlns:ma14="http://schemas.microsoft.com/office/mac/drawingml/2011/main" xmlns="" val="1"/>
+              <ma14:wrappingTextBoxFlag xmlns="" xmlns:ma14="http://schemas.microsoft.com/office/mac/drawingml/2011/main" val="1"/>
             </a:ext>
           </a:extLst>
         </p:spPr>
@@ -5443,7 +5451,7 @@
           </a:ln>
           <a:extLst>
             <a:ext uri="{C572A759-6A51-4108-AA02-DFA0A04FC94B}">
-              <ma14:wrappingTextBoxFlag xmlns:ma14="http://schemas.microsoft.com/office/mac/drawingml/2011/main" xmlns="" val="1"/>
+              <ma14:wrappingTextBoxFlag xmlns="" xmlns:ma14="http://schemas.microsoft.com/office/mac/drawingml/2011/main" val="1"/>
             </a:ext>
           </a:extLst>
         </p:spPr>
@@ -5530,7 +5538,7 @@
           </a:ln>
           <a:extLst>
             <a:ext uri="{C572A759-6A51-4108-AA02-DFA0A04FC94B}">
-              <ma14:wrappingTextBoxFlag xmlns:ma14="http://schemas.microsoft.com/office/mac/drawingml/2011/main" xmlns="" val="1"/>
+              <ma14:wrappingTextBoxFlag xmlns="" xmlns:ma14="http://schemas.microsoft.com/office/mac/drawingml/2011/main" val="1"/>
             </a:ext>
           </a:extLst>
         </p:spPr>
@@ -5617,7 +5625,7 @@
           </a:ln>
           <a:extLst>
             <a:ext uri="{C572A759-6A51-4108-AA02-DFA0A04FC94B}">
-              <ma14:wrappingTextBoxFlag xmlns:ma14="http://schemas.microsoft.com/office/mac/drawingml/2011/main" xmlns="" val="1"/>
+              <ma14:wrappingTextBoxFlag xmlns="" xmlns:ma14="http://schemas.microsoft.com/office/mac/drawingml/2011/main" val="1"/>
             </a:ext>
           </a:extLst>
         </p:spPr>
@@ -5702,7 +5710,7 @@
           </a:ln>
           <a:extLst>
             <a:ext uri="{C572A759-6A51-4108-AA02-DFA0A04FC94B}">
-              <ma14:wrappingTextBoxFlag xmlns:ma14="http://schemas.microsoft.com/office/mac/drawingml/2011/main" xmlns="" val="1"/>
+              <ma14:wrappingTextBoxFlag xmlns="" xmlns:ma14="http://schemas.microsoft.com/office/mac/drawingml/2011/main" val="1"/>
             </a:ext>
           </a:extLst>
         </p:spPr>
@@ -5787,7 +5795,7 @@
           </a:ln>
           <a:extLst>
             <a:ext uri="{C572A759-6A51-4108-AA02-DFA0A04FC94B}">
-              <ma14:wrappingTextBoxFlag xmlns:ma14="http://schemas.microsoft.com/office/mac/drawingml/2011/main" xmlns="" val="1"/>
+              <ma14:wrappingTextBoxFlag xmlns="" xmlns:ma14="http://schemas.microsoft.com/office/mac/drawingml/2011/main" val="1"/>
             </a:ext>
           </a:extLst>
         </p:spPr>
@@ -6017,7 +6025,7 @@
           </a:ln>
           <a:extLst>
             <a:ext uri="{C572A759-6A51-4108-AA02-DFA0A04FC94B}">
-              <ma14:wrappingTextBoxFlag xmlns:ma14="http://schemas.microsoft.com/office/mac/drawingml/2011/main" xmlns="" val="1"/>
+              <ma14:wrappingTextBoxFlag xmlns="" xmlns:ma14="http://schemas.microsoft.com/office/mac/drawingml/2011/main" val="1"/>
             </a:ext>
           </a:extLst>
         </p:spPr>
@@ -6125,7 +6133,7 @@
           </a:ln>
           <a:extLst>
             <a:ext uri="{C572A759-6A51-4108-AA02-DFA0A04FC94B}">
-              <ma14:wrappingTextBoxFlag xmlns:ma14="http://schemas.microsoft.com/office/mac/drawingml/2011/main" xmlns="" val="1"/>
+              <ma14:wrappingTextBoxFlag xmlns="" xmlns:ma14="http://schemas.microsoft.com/office/mac/drawingml/2011/main" val="1"/>
             </a:ext>
           </a:extLst>
         </p:spPr>
@@ -6225,7 +6233,7 @@
           </a:ln>
           <a:extLst>
             <a:ext uri="{C572A759-6A51-4108-AA02-DFA0A04FC94B}">
-              <ma14:wrappingTextBoxFlag xmlns:ma14="http://schemas.microsoft.com/office/mac/drawingml/2011/main" xmlns="" val="1"/>
+              <ma14:wrappingTextBoxFlag xmlns="" xmlns:ma14="http://schemas.microsoft.com/office/mac/drawingml/2011/main" val="1"/>
             </a:ext>
           </a:extLst>
         </p:spPr>
@@ -6281,7 +6289,7 @@
           </a:ln>
           <a:extLst>
             <a:ext uri="{C572A759-6A51-4108-AA02-DFA0A04FC94B}">
-              <ma14:wrappingTextBoxFlag xmlns:ma14="http://schemas.microsoft.com/office/mac/drawingml/2011/main" xmlns="" val="1"/>
+              <ma14:wrappingTextBoxFlag xmlns="" xmlns:ma14="http://schemas.microsoft.com/office/mac/drawingml/2011/main" val="1"/>
             </a:ext>
           </a:extLst>
         </p:spPr>
@@ -6394,7 +6402,7 @@
           </a:ln>
           <a:extLst>
             <a:ext uri="{C572A759-6A51-4108-AA02-DFA0A04FC94B}">
-              <ma14:wrappingTextBoxFlag xmlns:ma14="http://schemas.microsoft.com/office/mac/drawingml/2011/main" xmlns="" val="1"/>
+              <ma14:wrappingTextBoxFlag xmlns="" xmlns:ma14="http://schemas.microsoft.com/office/mac/drawingml/2011/main" val="1"/>
             </a:ext>
           </a:extLst>
         </p:spPr>
@@ -6620,7 +6628,7 @@
           </a:ln>
           <a:extLst>
             <a:ext uri="{C572A759-6A51-4108-AA02-DFA0A04FC94B}">
-              <ma14:wrappingTextBoxFlag xmlns:ma14="http://schemas.microsoft.com/office/mac/drawingml/2011/main" xmlns="" val="1"/>
+              <ma14:wrappingTextBoxFlag xmlns="" xmlns:ma14="http://schemas.microsoft.com/office/mac/drawingml/2011/main" val="1"/>
             </a:ext>
           </a:extLst>
         </p:spPr>
@@ -6704,7 +6712,7 @@
           </a:ln>
           <a:extLst>
             <a:ext uri="{C572A759-6A51-4108-AA02-DFA0A04FC94B}">
-              <ma14:wrappingTextBoxFlag xmlns:ma14="http://schemas.microsoft.com/office/mac/drawingml/2011/main" xmlns="" val="1"/>
+              <ma14:wrappingTextBoxFlag xmlns="" xmlns:ma14="http://schemas.microsoft.com/office/mac/drawingml/2011/main" val="1"/>
             </a:ext>
           </a:extLst>
         </p:spPr>
@@ -8164,7 +8172,7 @@
           </a:ln>
           <a:extLst>
             <a:ext uri="{C572A759-6A51-4108-AA02-DFA0A04FC94B}">
-              <ma14:wrappingTextBoxFlag xmlns:ma14="http://schemas.microsoft.com/office/mac/drawingml/2011/main" xmlns="" val="1"/>
+              <ma14:wrappingTextBoxFlag xmlns="" xmlns:ma14="http://schemas.microsoft.com/office/mac/drawingml/2011/main" val="1"/>
             </a:ext>
           </a:extLst>
         </p:spPr>
@@ -9785,7 +9793,7 @@
           </a:ln>
           <a:extLst>
             <a:ext uri="{C572A759-6A51-4108-AA02-DFA0A04FC94B}">
-              <ma14:wrappingTextBoxFlag xmlns:ma14="http://schemas.microsoft.com/office/mac/drawingml/2011/main" xmlns="" val="1"/>
+              <ma14:wrappingTextBoxFlag xmlns="" xmlns:ma14="http://schemas.microsoft.com/office/mac/drawingml/2011/main" val="1"/>
             </a:ext>
           </a:extLst>
         </p:spPr>
@@ -11248,7 +11256,7 @@
           </a:ln>
           <a:extLst>
             <a:ext uri="{C572A759-6A51-4108-AA02-DFA0A04FC94B}">
-              <ma14:wrappingTextBoxFlag xmlns:ma14="http://schemas.microsoft.com/office/mac/drawingml/2011/main" xmlns="" val="1"/>
+              <ma14:wrappingTextBoxFlag xmlns="" xmlns:ma14="http://schemas.microsoft.com/office/mac/drawingml/2011/main" val="1"/>
             </a:ext>
           </a:extLst>
         </p:spPr>
@@ -13070,7 +13078,7 @@
           </a:ln>
           <a:extLst>
             <a:ext uri="{C572A759-6A51-4108-AA02-DFA0A04FC94B}">
-              <ma14:wrappingTextBoxFlag xmlns:ma14="http://schemas.microsoft.com/office/mac/drawingml/2011/main" xmlns="" val="1"/>
+              <ma14:wrappingTextBoxFlag xmlns="" xmlns:ma14="http://schemas.microsoft.com/office/mac/drawingml/2011/main" val="1"/>
             </a:ext>
           </a:extLst>
         </p:spPr>
@@ -15080,7 +15088,7 @@
           </a:ln>
           <a:extLst>
             <a:ext uri="{C572A759-6A51-4108-AA02-DFA0A04FC94B}">
-              <ma14:wrappingTextBoxFlag xmlns:ma14="http://schemas.microsoft.com/office/mac/drawingml/2011/main" xmlns="" val="1"/>
+              <ma14:wrappingTextBoxFlag xmlns="" xmlns:ma14="http://schemas.microsoft.com/office/mac/drawingml/2011/main" val="1"/>
             </a:ext>
           </a:extLst>
         </p:spPr>

</xml_diff>